<commit_message>
updated Day 7 training materials
</commit_message>
<xml_diff>
--- a/Day 6/Slides/1. Course Overview/course-overview.pptx
+++ b/Day 6/Slides/1. Course Overview/course-overview.pptx
@@ -5,15 +5,15 @@
     <p:sldMasterId id="2147483648" r:id="rId1"/>
   </p:sldMasterIdLst>
   <p:notesMasterIdLst>
-    <p:notesMasterId r:id="rId9"/>
+    <p:notesMasterId r:id="rId8"/>
   </p:notesMasterIdLst>
   <p:sldIdLst>
-    <p:sldId id="259" r:id="rId3"/>
-    <p:sldId id="256" r:id="rId4"/>
-    <p:sldId id="258" r:id="rId5"/>
-    <p:sldId id="264" r:id="rId6"/>
-    <p:sldId id="265" r:id="rId7"/>
-    <p:sldId id="266" r:id="rId8"/>
+    <p:sldId id="259" r:id="rId2"/>
+    <p:sldId id="256" r:id="rId3"/>
+    <p:sldId id="258" r:id="rId4"/>
+    <p:sldId id="264" r:id="rId5"/>
+    <p:sldId id="265" r:id="rId6"/>
+    <p:sldId id="266" r:id="rId7"/>
   </p:sldIdLst>
   <p:sldSz cx="12192000" cy="6858000"/>
   <p:notesSz cx="6858000" cy="9144000"/>
@@ -112,6 +112,11 @@
       </a:defRPr>
     </a:lvl9pPr>
   </p:defaultTextStyle>
+  <p:extLst>
+    <p:ext uri="{EFAFB233-063F-42B5-8137-9DF3F51BA10A}">
+      <p15:sldGuideLst xmlns:p15="http://schemas.microsoft.com/office/powerpoint/2012/main"/>
+    </p:ext>
+  </p:extLst>
 </p:presentation>
 </file>
 
@@ -197,6 +202,7 @@
           <a:p>
             <a:fld id="{3EFD42F7-718C-4B98-AAEC-167E6DDD60A7}" type="datetimeFigureOut">
               <a:rPr lang="en-US" smtClean="0"/>
+              <a:t>8/11/2023</a:t>
             </a:fld>
             <a:endParaRPr lang="en-US"/>
           </a:p>
@@ -260,42 +266,37 @@
           <a:p>
             <a:pPr lvl="0"/>
             <a:r>
-              <a:rPr lang="en-US" smtClean="0"/>
+              <a:rPr lang="en-US"/>
               <a:t>Click to edit Master text styles</a:t>
             </a:r>
-            <a:endParaRPr lang="en-US" smtClean="0"/>
           </a:p>
           <a:p>
             <a:pPr lvl="1"/>
             <a:r>
-              <a:rPr lang="en-US" smtClean="0"/>
+              <a:rPr lang="en-US"/>
               <a:t>Second level</a:t>
             </a:r>
-            <a:endParaRPr lang="en-US" smtClean="0"/>
           </a:p>
           <a:p>
             <a:pPr lvl="2"/>
             <a:r>
-              <a:rPr lang="en-US" smtClean="0"/>
+              <a:rPr lang="en-US"/>
               <a:t>Third level</a:t>
             </a:r>
-            <a:endParaRPr lang="en-US" smtClean="0"/>
           </a:p>
           <a:p>
             <a:pPr lvl="3"/>
             <a:r>
-              <a:rPr lang="en-US" smtClean="0"/>
+              <a:rPr lang="en-US"/>
               <a:t>Fourth level</a:t>
             </a:r>
-            <a:endParaRPr lang="en-US" smtClean="0"/>
           </a:p>
           <a:p>
             <a:pPr lvl="4"/>
             <a:r>
-              <a:rPr lang="en-US" smtClean="0"/>
+              <a:rPr lang="en-US"/>
               <a:t>Fifth level</a:t>
             </a:r>
-            <a:endParaRPr lang="en-US"/>
           </a:p>
         </p:txBody>
       </p:sp>
@@ -359,6 +360,7 @@
           <a:p>
             <a:fld id="{21B2AA4F-B828-4D7C-AFD3-893933DAFCB4}" type="slidenum">
               <a:rPr lang="en-US" smtClean="0"/>
+              <a:t>‹#›</a:t>
             </a:fld>
             <a:endParaRPr lang="en-US"/>
           </a:p>
@@ -504,10 +506,9 @@
           </a:lstStyle>
           <a:p>
             <a:r>
-              <a:rPr lang="en-US" smtClean="0"/>
+              <a:rPr lang="en-US"/>
               <a:t>Click to edit Master title style</a:t>
             </a:r>
-            <a:endParaRPr lang="en-US"/>
           </a:p>
         </p:txBody>
       </p:sp>
@@ -569,10 +570,9 @@
           </a:lstStyle>
           <a:p>
             <a:r>
-              <a:rPr lang="en-US" smtClean="0"/>
+              <a:rPr lang="en-US"/>
               <a:t>Click to edit Master subtitle style</a:t>
             </a:r>
-            <a:endParaRPr lang="en-US"/>
           </a:p>
         </p:txBody>
       </p:sp>
@@ -593,6 +593,7 @@
           <a:p>
             <a:fld id="{63A1C593-65D0-4073-BCC9-577B9352EA97}" type="datetimeFigureOut">
               <a:rPr lang="en-US" smtClean="0"/>
+              <a:t>8/11/2023</a:t>
             </a:fld>
             <a:endParaRPr lang="en-US"/>
           </a:p>
@@ -634,6 +635,7 @@
           <a:p>
             <a:fld id="{9B618960-8005-486C-9A75-10CB2AAC16F9}" type="slidenum">
               <a:rPr lang="en-US" smtClean="0"/>
+              <a:t>‹#›</a:t>
             </a:fld>
             <a:endParaRPr lang="en-US"/>
           </a:p>
@@ -681,10 +683,9 @@
           <a:lstStyle/>
           <a:p>
             <a:r>
-              <a:rPr lang="en-US" smtClean="0"/>
+              <a:rPr lang="en-US"/>
               <a:t>Click to edit Master title style</a:t>
             </a:r>
-            <a:endParaRPr lang="en-US"/>
           </a:p>
         </p:txBody>
       </p:sp>
@@ -705,42 +706,37 @@
           <a:p>
             <a:pPr lvl="0"/>
             <a:r>
-              <a:rPr lang="en-US" smtClean="0"/>
+              <a:rPr lang="en-US"/>
               <a:t>Click to edit Master text styles</a:t>
             </a:r>
-            <a:endParaRPr lang="en-US" smtClean="0"/>
           </a:p>
           <a:p>
             <a:pPr lvl="1"/>
             <a:r>
-              <a:rPr lang="en-US" smtClean="0"/>
+              <a:rPr lang="en-US"/>
               <a:t>Second level</a:t>
             </a:r>
-            <a:endParaRPr lang="en-US" smtClean="0"/>
           </a:p>
           <a:p>
             <a:pPr lvl="2"/>
             <a:r>
-              <a:rPr lang="en-US" smtClean="0"/>
+              <a:rPr lang="en-US"/>
               <a:t>Third level</a:t>
             </a:r>
-            <a:endParaRPr lang="en-US" smtClean="0"/>
           </a:p>
           <a:p>
             <a:pPr lvl="3"/>
             <a:r>
-              <a:rPr lang="en-US" smtClean="0"/>
+              <a:rPr lang="en-US"/>
               <a:t>Fourth level</a:t>
             </a:r>
-            <a:endParaRPr lang="en-US" smtClean="0"/>
           </a:p>
           <a:p>
             <a:pPr lvl="4"/>
             <a:r>
-              <a:rPr lang="en-US" smtClean="0"/>
+              <a:rPr lang="en-US"/>
               <a:t>Fifth level</a:t>
             </a:r>
-            <a:endParaRPr lang="en-US"/>
           </a:p>
         </p:txBody>
       </p:sp>
@@ -761,6 +757,7 @@
           <a:p>
             <a:fld id="{63A1C593-65D0-4073-BCC9-577B9352EA97}" type="datetimeFigureOut">
               <a:rPr lang="en-US" smtClean="0"/>
+              <a:t>8/11/2023</a:t>
             </a:fld>
             <a:endParaRPr lang="en-US"/>
           </a:p>
@@ -802,6 +799,7 @@
           <a:p>
             <a:fld id="{9B618960-8005-486C-9A75-10CB2AAC16F9}" type="slidenum">
               <a:rPr lang="en-US" smtClean="0"/>
+              <a:t>‹#›</a:t>
             </a:fld>
             <a:endParaRPr lang="en-US"/>
           </a:p>
@@ -854,10 +852,9 @@
           <a:lstStyle/>
           <a:p>
             <a:r>
-              <a:rPr lang="en-US" smtClean="0"/>
+              <a:rPr lang="en-US"/>
               <a:t>Click to edit Master title style</a:t>
             </a:r>
-            <a:endParaRPr lang="en-US"/>
           </a:p>
         </p:txBody>
       </p:sp>
@@ -883,42 +880,37 @@
           <a:p>
             <a:pPr lvl="0"/>
             <a:r>
-              <a:rPr lang="en-US" smtClean="0"/>
+              <a:rPr lang="en-US"/>
               <a:t>Click to edit Master text styles</a:t>
             </a:r>
-            <a:endParaRPr lang="en-US" smtClean="0"/>
           </a:p>
           <a:p>
             <a:pPr lvl="1"/>
             <a:r>
-              <a:rPr lang="en-US" smtClean="0"/>
+              <a:rPr lang="en-US"/>
               <a:t>Second level</a:t>
             </a:r>
-            <a:endParaRPr lang="en-US" smtClean="0"/>
           </a:p>
           <a:p>
             <a:pPr lvl="2"/>
             <a:r>
-              <a:rPr lang="en-US" smtClean="0"/>
+              <a:rPr lang="en-US"/>
               <a:t>Third level</a:t>
             </a:r>
-            <a:endParaRPr lang="en-US" smtClean="0"/>
           </a:p>
           <a:p>
             <a:pPr lvl="3"/>
             <a:r>
-              <a:rPr lang="en-US" smtClean="0"/>
+              <a:rPr lang="en-US"/>
               <a:t>Fourth level</a:t>
             </a:r>
-            <a:endParaRPr lang="en-US" smtClean="0"/>
           </a:p>
           <a:p>
             <a:pPr lvl="4"/>
             <a:r>
-              <a:rPr lang="en-US" smtClean="0"/>
+              <a:rPr lang="en-US"/>
               <a:t>Fifth level</a:t>
             </a:r>
-            <a:endParaRPr lang="en-US"/>
           </a:p>
         </p:txBody>
       </p:sp>
@@ -939,6 +931,7 @@
           <a:p>
             <a:fld id="{63A1C593-65D0-4073-BCC9-577B9352EA97}" type="datetimeFigureOut">
               <a:rPr lang="en-US" smtClean="0"/>
+              <a:t>8/11/2023</a:t>
             </a:fld>
             <a:endParaRPr lang="en-US"/>
           </a:p>
@@ -980,6 +973,7 @@
           <a:p>
             <a:fld id="{9B618960-8005-486C-9A75-10CB2AAC16F9}" type="slidenum">
               <a:rPr lang="en-US" smtClean="0"/>
+              <a:t>‹#›</a:t>
             </a:fld>
             <a:endParaRPr lang="en-US"/>
           </a:p>
@@ -1027,10 +1021,9 @@
           <a:lstStyle/>
           <a:p>
             <a:r>
-              <a:rPr lang="en-US" smtClean="0"/>
+              <a:rPr lang="en-US"/>
               <a:t>Click to edit Master title style</a:t>
             </a:r>
-            <a:endParaRPr lang="en-US"/>
           </a:p>
         </p:txBody>
       </p:sp>
@@ -1051,42 +1044,37 @@
           <a:p>
             <a:pPr lvl="0"/>
             <a:r>
-              <a:rPr lang="en-US" smtClean="0"/>
+              <a:rPr lang="en-US"/>
               <a:t>Click to edit Master text styles</a:t>
             </a:r>
-            <a:endParaRPr lang="en-US" smtClean="0"/>
           </a:p>
           <a:p>
             <a:pPr lvl="1"/>
             <a:r>
-              <a:rPr lang="en-US" smtClean="0"/>
+              <a:rPr lang="en-US"/>
               <a:t>Second level</a:t>
             </a:r>
-            <a:endParaRPr lang="en-US" smtClean="0"/>
           </a:p>
           <a:p>
             <a:pPr lvl="2"/>
             <a:r>
-              <a:rPr lang="en-US" smtClean="0"/>
+              <a:rPr lang="en-US"/>
               <a:t>Third level</a:t>
             </a:r>
-            <a:endParaRPr lang="en-US" smtClean="0"/>
           </a:p>
           <a:p>
             <a:pPr lvl="3"/>
             <a:r>
-              <a:rPr lang="en-US" smtClean="0"/>
+              <a:rPr lang="en-US"/>
               <a:t>Fourth level</a:t>
             </a:r>
-            <a:endParaRPr lang="en-US" smtClean="0"/>
           </a:p>
           <a:p>
             <a:pPr lvl="4"/>
             <a:r>
-              <a:rPr lang="en-US" smtClean="0"/>
+              <a:rPr lang="en-US"/>
               <a:t>Fifth level</a:t>
             </a:r>
-            <a:endParaRPr lang="en-US"/>
           </a:p>
         </p:txBody>
       </p:sp>
@@ -1107,6 +1095,7 @@
           <a:p>
             <a:fld id="{63A1C593-65D0-4073-BCC9-577B9352EA97}" type="datetimeFigureOut">
               <a:rPr lang="en-US" smtClean="0"/>
+              <a:t>8/11/2023</a:t>
             </a:fld>
             <a:endParaRPr lang="en-US"/>
           </a:p>
@@ -1148,6 +1137,7 @@
           <a:p>
             <a:fld id="{9B618960-8005-486C-9A75-10CB2AAC16F9}" type="slidenum">
               <a:rPr lang="en-US" smtClean="0"/>
+              <a:t>‹#›</a:t>
             </a:fld>
             <a:endParaRPr lang="en-US"/>
           </a:p>
@@ -1204,10 +1194,9 @@
           </a:lstStyle>
           <a:p>
             <a:r>
-              <a:rPr lang="en-US" smtClean="0"/>
+              <a:rPr lang="en-US"/>
               <a:t>Click to edit Master title style</a:t>
             </a:r>
-            <a:endParaRPr lang="en-US"/>
           </a:p>
         </p:txBody>
       </p:sp>
@@ -1324,10 +1313,9 @@
           <a:p>
             <a:pPr lvl="0"/>
             <a:r>
-              <a:rPr lang="en-US" smtClean="0"/>
+              <a:rPr lang="en-US"/>
               <a:t>Click to edit Master text styles</a:t>
             </a:r>
-            <a:endParaRPr lang="en-US" smtClean="0"/>
           </a:p>
         </p:txBody>
       </p:sp>
@@ -1348,6 +1336,7 @@
           <a:p>
             <a:fld id="{63A1C593-65D0-4073-BCC9-577B9352EA97}" type="datetimeFigureOut">
               <a:rPr lang="en-US" smtClean="0"/>
+              <a:t>8/11/2023</a:t>
             </a:fld>
             <a:endParaRPr lang="en-US"/>
           </a:p>
@@ -1389,6 +1378,7 @@
           <a:p>
             <a:fld id="{9B618960-8005-486C-9A75-10CB2AAC16F9}" type="slidenum">
               <a:rPr lang="en-US" smtClean="0"/>
+              <a:t>‹#›</a:t>
             </a:fld>
             <a:endParaRPr lang="en-US"/>
           </a:p>
@@ -1436,10 +1426,9 @@
           <a:lstStyle/>
           <a:p>
             <a:r>
-              <a:rPr lang="en-US" smtClean="0"/>
+              <a:rPr lang="en-US"/>
               <a:t>Click to edit Master title style</a:t>
             </a:r>
-            <a:endParaRPr lang="en-US"/>
           </a:p>
         </p:txBody>
       </p:sp>
@@ -1465,42 +1454,37 @@
           <a:p>
             <a:pPr lvl="0"/>
             <a:r>
-              <a:rPr lang="en-US" smtClean="0"/>
+              <a:rPr lang="en-US"/>
               <a:t>Click to edit Master text styles</a:t>
             </a:r>
-            <a:endParaRPr lang="en-US" smtClean="0"/>
           </a:p>
           <a:p>
             <a:pPr lvl="1"/>
             <a:r>
-              <a:rPr lang="en-US" smtClean="0"/>
+              <a:rPr lang="en-US"/>
               <a:t>Second level</a:t>
             </a:r>
-            <a:endParaRPr lang="en-US" smtClean="0"/>
           </a:p>
           <a:p>
             <a:pPr lvl="2"/>
             <a:r>
-              <a:rPr lang="en-US" smtClean="0"/>
+              <a:rPr lang="en-US"/>
               <a:t>Third level</a:t>
             </a:r>
-            <a:endParaRPr lang="en-US" smtClean="0"/>
           </a:p>
           <a:p>
             <a:pPr lvl="3"/>
             <a:r>
-              <a:rPr lang="en-US" smtClean="0"/>
+              <a:rPr lang="en-US"/>
               <a:t>Fourth level</a:t>
             </a:r>
-            <a:endParaRPr lang="en-US" smtClean="0"/>
           </a:p>
           <a:p>
             <a:pPr lvl="4"/>
             <a:r>
-              <a:rPr lang="en-US" smtClean="0"/>
+              <a:rPr lang="en-US"/>
               <a:t>Fifth level</a:t>
             </a:r>
-            <a:endParaRPr lang="en-US"/>
           </a:p>
         </p:txBody>
       </p:sp>
@@ -1526,42 +1510,37 @@
           <a:p>
             <a:pPr lvl="0"/>
             <a:r>
-              <a:rPr lang="en-US" smtClean="0"/>
+              <a:rPr lang="en-US"/>
               <a:t>Click to edit Master text styles</a:t>
             </a:r>
-            <a:endParaRPr lang="en-US" smtClean="0"/>
           </a:p>
           <a:p>
             <a:pPr lvl="1"/>
             <a:r>
-              <a:rPr lang="en-US" smtClean="0"/>
+              <a:rPr lang="en-US"/>
               <a:t>Second level</a:t>
             </a:r>
-            <a:endParaRPr lang="en-US" smtClean="0"/>
           </a:p>
           <a:p>
             <a:pPr lvl="2"/>
             <a:r>
-              <a:rPr lang="en-US" smtClean="0"/>
+              <a:rPr lang="en-US"/>
               <a:t>Third level</a:t>
             </a:r>
-            <a:endParaRPr lang="en-US" smtClean="0"/>
           </a:p>
           <a:p>
             <a:pPr lvl="3"/>
             <a:r>
-              <a:rPr lang="en-US" smtClean="0"/>
+              <a:rPr lang="en-US"/>
               <a:t>Fourth level</a:t>
             </a:r>
-            <a:endParaRPr lang="en-US" smtClean="0"/>
           </a:p>
           <a:p>
             <a:pPr lvl="4"/>
             <a:r>
-              <a:rPr lang="en-US" smtClean="0"/>
+              <a:rPr lang="en-US"/>
               <a:t>Fifth level</a:t>
             </a:r>
-            <a:endParaRPr lang="en-US"/>
           </a:p>
         </p:txBody>
       </p:sp>
@@ -1582,6 +1561,7 @@
           <a:p>
             <a:fld id="{63A1C593-65D0-4073-BCC9-577B9352EA97}" type="datetimeFigureOut">
               <a:rPr lang="en-US" smtClean="0"/>
+              <a:t>8/11/2023</a:t>
             </a:fld>
             <a:endParaRPr lang="en-US"/>
           </a:p>
@@ -1623,6 +1603,7 @@
           <a:p>
             <a:fld id="{9B618960-8005-486C-9A75-10CB2AAC16F9}" type="slidenum">
               <a:rPr lang="en-US" smtClean="0"/>
+              <a:t>‹#›</a:t>
             </a:fld>
             <a:endParaRPr lang="en-US"/>
           </a:p>
@@ -1675,10 +1656,9 @@
           <a:lstStyle/>
           <a:p>
             <a:r>
-              <a:rPr lang="en-US" smtClean="0"/>
+              <a:rPr lang="en-US"/>
               <a:t>Click to edit Master title style</a:t>
             </a:r>
-            <a:endParaRPr lang="en-US"/>
           </a:p>
         </p:txBody>
       </p:sp>
@@ -1741,10 +1721,9 @@
           <a:p>
             <a:pPr lvl="0"/>
             <a:r>
-              <a:rPr lang="en-US" smtClean="0"/>
+              <a:rPr lang="en-US"/>
               <a:t>Click to edit Master text styles</a:t>
             </a:r>
-            <a:endParaRPr lang="en-US" smtClean="0"/>
           </a:p>
         </p:txBody>
       </p:sp>
@@ -1770,42 +1749,37 @@
           <a:p>
             <a:pPr lvl="0"/>
             <a:r>
-              <a:rPr lang="en-US" smtClean="0"/>
+              <a:rPr lang="en-US"/>
               <a:t>Click to edit Master text styles</a:t>
             </a:r>
-            <a:endParaRPr lang="en-US" smtClean="0"/>
           </a:p>
           <a:p>
             <a:pPr lvl="1"/>
             <a:r>
-              <a:rPr lang="en-US" smtClean="0"/>
+              <a:rPr lang="en-US"/>
               <a:t>Second level</a:t>
             </a:r>
-            <a:endParaRPr lang="en-US" smtClean="0"/>
           </a:p>
           <a:p>
             <a:pPr lvl="2"/>
             <a:r>
-              <a:rPr lang="en-US" smtClean="0"/>
+              <a:rPr lang="en-US"/>
               <a:t>Third level</a:t>
             </a:r>
-            <a:endParaRPr lang="en-US" smtClean="0"/>
           </a:p>
           <a:p>
             <a:pPr lvl="3"/>
             <a:r>
-              <a:rPr lang="en-US" smtClean="0"/>
+              <a:rPr lang="en-US"/>
               <a:t>Fourth level</a:t>
             </a:r>
-            <a:endParaRPr lang="en-US" smtClean="0"/>
           </a:p>
           <a:p>
             <a:pPr lvl="4"/>
             <a:r>
-              <a:rPr lang="en-US" smtClean="0"/>
+              <a:rPr lang="en-US"/>
               <a:t>Fifth level</a:t>
             </a:r>
-            <a:endParaRPr lang="en-US"/>
           </a:p>
         </p:txBody>
       </p:sp>
@@ -1868,10 +1842,9 @@
           <a:p>
             <a:pPr lvl="0"/>
             <a:r>
-              <a:rPr lang="en-US" smtClean="0"/>
+              <a:rPr lang="en-US"/>
               <a:t>Click to edit Master text styles</a:t>
             </a:r>
-            <a:endParaRPr lang="en-US" smtClean="0"/>
           </a:p>
         </p:txBody>
       </p:sp>
@@ -1897,42 +1870,37 @@
           <a:p>
             <a:pPr lvl="0"/>
             <a:r>
-              <a:rPr lang="en-US" smtClean="0"/>
+              <a:rPr lang="en-US"/>
               <a:t>Click to edit Master text styles</a:t>
             </a:r>
-            <a:endParaRPr lang="en-US" smtClean="0"/>
           </a:p>
           <a:p>
             <a:pPr lvl="1"/>
             <a:r>
-              <a:rPr lang="en-US" smtClean="0"/>
+              <a:rPr lang="en-US"/>
               <a:t>Second level</a:t>
             </a:r>
-            <a:endParaRPr lang="en-US" smtClean="0"/>
           </a:p>
           <a:p>
             <a:pPr lvl="2"/>
             <a:r>
-              <a:rPr lang="en-US" smtClean="0"/>
+              <a:rPr lang="en-US"/>
               <a:t>Third level</a:t>
             </a:r>
-            <a:endParaRPr lang="en-US" smtClean="0"/>
           </a:p>
           <a:p>
             <a:pPr lvl="3"/>
             <a:r>
-              <a:rPr lang="en-US" smtClean="0"/>
+              <a:rPr lang="en-US"/>
               <a:t>Fourth level</a:t>
             </a:r>
-            <a:endParaRPr lang="en-US" smtClean="0"/>
           </a:p>
           <a:p>
             <a:pPr lvl="4"/>
             <a:r>
-              <a:rPr lang="en-US" smtClean="0"/>
+              <a:rPr lang="en-US"/>
               <a:t>Fifth level</a:t>
             </a:r>
-            <a:endParaRPr lang="en-US"/>
           </a:p>
         </p:txBody>
       </p:sp>
@@ -1953,6 +1921,7 @@
           <a:p>
             <a:fld id="{63A1C593-65D0-4073-BCC9-577B9352EA97}" type="datetimeFigureOut">
               <a:rPr lang="en-US" smtClean="0"/>
+              <a:t>8/11/2023</a:t>
             </a:fld>
             <a:endParaRPr lang="en-US"/>
           </a:p>
@@ -1994,6 +1963,7 @@
           <a:p>
             <a:fld id="{9B618960-8005-486C-9A75-10CB2AAC16F9}" type="slidenum">
               <a:rPr lang="en-US" smtClean="0"/>
+              <a:t>‹#›</a:t>
             </a:fld>
             <a:endParaRPr lang="en-US"/>
           </a:p>
@@ -2041,10 +2011,9 @@
           <a:lstStyle/>
           <a:p>
             <a:r>
-              <a:rPr lang="en-US" smtClean="0"/>
+              <a:rPr lang="en-US"/>
               <a:t>Click to edit Master title style</a:t>
             </a:r>
-            <a:endParaRPr lang="en-US"/>
           </a:p>
         </p:txBody>
       </p:sp>
@@ -2065,6 +2034,7 @@
           <a:p>
             <a:fld id="{63A1C593-65D0-4073-BCC9-577B9352EA97}" type="datetimeFigureOut">
               <a:rPr lang="en-US" smtClean="0"/>
+              <a:t>8/11/2023</a:t>
             </a:fld>
             <a:endParaRPr lang="en-US"/>
           </a:p>
@@ -2106,6 +2076,7 @@
           <a:p>
             <a:fld id="{9B618960-8005-486C-9A75-10CB2AAC16F9}" type="slidenum">
               <a:rPr lang="en-US" smtClean="0"/>
+              <a:t>‹#›</a:t>
             </a:fld>
             <a:endParaRPr lang="en-US"/>
           </a:p>
@@ -2154,6 +2125,7 @@
           <a:p>
             <a:fld id="{63A1C593-65D0-4073-BCC9-577B9352EA97}" type="datetimeFigureOut">
               <a:rPr lang="en-US" smtClean="0"/>
+              <a:t>8/11/2023</a:t>
             </a:fld>
             <a:endParaRPr lang="en-US"/>
           </a:p>
@@ -2195,6 +2167,7 @@
           <a:p>
             <a:fld id="{9B618960-8005-486C-9A75-10CB2AAC16F9}" type="slidenum">
               <a:rPr lang="en-US" smtClean="0"/>
+              <a:t>‹#›</a:t>
             </a:fld>
             <a:endParaRPr lang="en-US"/>
           </a:p>
@@ -2251,10 +2224,9 @@
           </a:lstStyle>
           <a:p>
             <a:r>
-              <a:rPr lang="en-US" smtClean="0"/>
+              <a:rPr lang="en-US"/>
               <a:t>Click to edit Master title style</a:t>
             </a:r>
-            <a:endParaRPr lang="en-US"/>
           </a:p>
         </p:txBody>
       </p:sp>
@@ -2308,42 +2280,37 @@
           <a:p>
             <a:pPr lvl="0"/>
             <a:r>
-              <a:rPr lang="en-US" smtClean="0"/>
+              <a:rPr lang="en-US"/>
               <a:t>Click to edit Master text styles</a:t>
             </a:r>
-            <a:endParaRPr lang="en-US" smtClean="0"/>
           </a:p>
           <a:p>
             <a:pPr lvl="1"/>
             <a:r>
-              <a:rPr lang="en-US" smtClean="0"/>
+              <a:rPr lang="en-US"/>
               <a:t>Second level</a:t>
             </a:r>
-            <a:endParaRPr lang="en-US" smtClean="0"/>
           </a:p>
           <a:p>
             <a:pPr lvl="2"/>
             <a:r>
-              <a:rPr lang="en-US" smtClean="0"/>
+              <a:rPr lang="en-US"/>
               <a:t>Third level</a:t>
             </a:r>
-            <a:endParaRPr lang="en-US" smtClean="0"/>
           </a:p>
           <a:p>
             <a:pPr lvl="3"/>
             <a:r>
-              <a:rPr lang="en-US" smtClean="0"/>
+              <a:rPr lang="en-US"/>
               <a:t>Fourth level</a:t>
             </a:r>
-            <a:endParaRPr lang="en-US" smtClean="0"/>
           </a:p>
           <a:p>
             <a:pPr lvl="4"/>
             <a:r>
-              <a:rPr lang="en-US" smtClean="0"/>
+              <a:rPr lang="en-US"/>
               <a:t>Fifth level</a:t>
             </a:r>
-            <a:endParaRPr lang="en-US"/>
           </a:p>
         </p:txBody>
       </p:sp>
@@ -2406,10 +2373,9 @@
           <a:p>
             <a:pPr lvl="0"/>
             <a:r>
-              <a:rPr lang="en-US" smtClean="0"/>
+              <a:rPr lang="en-US"/>
               <a:t>Click to edit Master text styles</a:t>
             </a:r>
-            <a:endParaRPr lang="en-US" smtClean="0"/>
           </a:p>
         </p:txBody>
       </p:sp>
@@ -2430,6 +2396,7 @@
           <a:p>
             <a:fld id="{63A1C593-65D0-4073-BCC9-577B9352EA97}" type="datetimeFigureOut">
               <a:rPr lang="en-US" smtClean="0"/>
+              <a:t>8/11/2023</a:t>
             </a:fld>
             <a:endParaRPr lang="en-US"/>
           </a:p>
@@ -2471,6 +2438,7 @@
           <a:p>
             <a:fld id="{9B618960-8005-486C-9A75-10CB2AAC16F9}" type="slidenum">
               <a:rPr lang="en-US" smtClean="0"/>
+              <a:t>‹#›</a:t>
             </a:fld>
             <a:endParaRPr lang="en-US"/>
           </a:p>
@@ -2527,10 +2495,9 @@
           </a:lstStyle>
           <a:p>
             <a:r>
-              <a:rPr lang="en-US" smtClean="0"/>
+              <a:rPr lang="en-US"/>
               <a:t>Click to edit Master title style</a:t>
             </a:r>
-            <a:endParaRPr lang="en-US"/>
           </a:p>
         </p:txBody>
       </p:sp>
@@ -2654,10 +2621,9 @@
           <a:p>
             <a:pPr lvl="0"/>
             <a:r>
-              <a:rPr lang="en-US" smtClean="0"/>
+              <a:rPr lang="en-US"/>
               <a:t>Click to edit Master text styles</a:t>
             </a:r>
-            <a:endParaRPr lang="en-US" smtClean="0"/>
           </a:p>
         </p:txBody>
       </p:sp>
@@ -2678,6 +2644,7 @@
           <a:p>
             <a:fld id="{63A1C593-65D0-4073-BCC9-577B9352EA97}" type="datetimeFigureOut">
               <a:rPr lang="en-US" smtClean="0"/>
+              <a:t>8/11/2023</a:t>
             </a:fld>
             <a:endParaRPr lang="en-US"/>
           </a:p>
@@ -2719,6 +2686,7 @@
           <a:p>
             <a:fld id="{9B618960-8005-486C-9A75-10CB2AAC16F9}" type="slidenum">
               <a:rPr lang="en-US" smtClean="0"/>
+              <a:t>‹#›</a:t>
             </a:fld>
             <a:endParaRPr lang="en-US"/>
           </a:p>
@@ -2781,10 +2749,9 @@
           <a:lstStyle/>
           <a:p>
             <a:r>
-              <a:rPr lang="en-US" smtClean="0"/>
+              <a:rPr lang="en-US"/>
               <a:t>Click to edit Master title style</a:t>
             </a:r>
-            <a:endParaRPr lang="en-US"/>
           </a:p>
         </p:txBody>
       </p:sp>
@@ -2815,42 +2782,37 @@
           <a:p>
             <a:pPr lvl="0"/>
             <a:r>
-              <a:rPr lang="en-US" smtClean="0"/>
+              <a:rPr lang="en-US"/>
               <a:t>Click to edit Master text styles</a:t>
             </a:r>
-            <a:endParaRPr lang="en-US" smtClean="0"/>
           </a:p>
           <a:p>
             <a:pPr lvl="1"/>
             <a:r>
-              <a:rPr lang="en-US" smtClean="0"/>
+              <a:rPr lang="en-US"/>
               <a:t>Second level</a:t>
             </a:r>
-            <a:endParaRPr lang="en-US" smtClean="0"/>
           </a:p>
           <a:p>
             <a:pPr lvl="2"/>
             <a:r>
-              <a:rPr lang="en-US" smtClean="0"/>
+              <a:rPr lang="en-US"/>
               <a:t>Third level</a:t>
             </a:r>
-            <a:endParaRPr lang="en-US" smtClean="0"/>
           </a:p>
           <a:p>
             <a:pPr lvl="3"/>
             <a:r>
-              <a:rPr lang="en-US" smtClean="0"/>
+              <a:rPr lang="en-US"/>
               <a:t>Fourth level</a:t>
             </a:r>
-            <a:endParaRPr lang="en-US" smtClean="0"/>
           </a:p>
           <a:p>
             <a:pPr lvl="4"/>
             <a:r>
-              <a:rPr lang="en-US" smtClean="0"/>
+              <a:rPr lang="en-US"/>
               <a:t>Fifth level</a:t>
             </a:r>
-            <a:endParaRPr lang="en-US"/>
           </a:p>
         </p:txBody>
       </p:sp>
@@ -2889,6 +2851,7 @@
           <a:p>
             <a:fld id="{63A1C593-65D0-4073-BCC9-577B9352EA97}" type="datetimeFigureOut">
               <a:rPr lang="en-US" smtClean="0"/>
+              <a:t>8/11/2023</a:t>
             </a:fld>
             <a:endParaRPr lang="en-US"/>
           </a:p>
@@ -2966,6 +2929,7 @@
           <a:p>
             <a:fld id="{9B618960-8005-486C-9A75-10CB2AAC16F9}" type="slidenum">
               <a:rPr lang="en-US" smtClean="0"/>
+              <a:t>‹#›</a:t>
             </a:fld>
             <a:endParaRPr lang="en-US"/>
           </a:p>
@@ -3295,7 +3259,7 @@
           <p:nvPr/>
         </p:nvPicPr>
         <p:blipFill>
-          <a:blip r:embed="rId1" cstate="print"/>
+          <a:blip r:embed="rId2" cstate="print"/>
           <a:stretch>
             <a:fillRect/>
           </a:stretch>
@@ -3397,11 +3361,6 @@
               </a:rPr>
               <a:t>Database Applications with JDBC in Java SE applications</a:t>
             </a:r>
-            <a:endParaRPr sz="4500" dirty="0">
-              <a:solidFill>
-                <a:srgbClr val="171717"/>
-              </a:solidFill>
-            </a:endParaRPr>
           </a:p>
         </p:txBody>
       </p:sp>
@@ -3418,9 +3377,11 @@
         <p:spPr/>
         <p:txBody>
           <a:bodyPr/>
+          <a:lstStyle/>
           <a:p>
             <a:fld id="{9B618960-8005-486C-9A75-10CB2AAC16F9}" type="slidenum">
               <a:rPr lang="en-US" smtClean="0"/>
+              <a:t>1</a:t>
             </a:fld>
             <a:endParaRPr lang="en-US"/>
           </a:p>
@@ -3502,9 +3463,11 @@
         <p:spPr/>
         <p:txBody>
           <a:bodyPr/>
+          <a:lstStyle/>
           <a:p>
             <a:fld id="{9B618960-8005-486C-9A75-10CB2AAC16F9}" type="slidenum">
               <a:rPr lang="en-US" smtClean="0"/>
+              <a:t>2</a:t>
             </a:fld>
             <a:endParaRPr lang="en-US"/>
           </a:p>
@@ -3519,7 +3482,7 @@
           <p:nvPr/>
         </p:nvPicPr>
         <p:blipFill>
-          <a:blip r:embed="rId1"/>
+          <a:blip r:embed="rId2"/>
           <a:srcRect t="7298"/>
           <a:stretch>
             <a:fillRect/>
@@ -3552,7 +3515,14 @@
         <p:cNvGrpSpPr/>
         <p:nvPr/>
       </p:nvGrpSpPr>
-      <p:grpSpPr/>
+      <p:grpSpPr>
+        <a:xfrm>
+          <a:off x="0" y="0"/>
+          <a:ext cx="0" cy="0"/>
+          <a:chOff x="0" y="0"/>
+          <a:chExt cx="0" cy="0"/>
+        </a:xfrm>
+      </p:grpSpPr>
       <p:sp>
         <p:nvSpPr>
           <p:cNvPr id="2" name="Title 1"/>
@@ -3566,6 +3536,7 @@
         <p:spPr/>
         <p:txBody>
           <a:bodyPr/>
+          <a:lstStyle/>
           <a:p>
             <a:endParaRPr lang="en-US"/>
           </a:p>
@@ -3584,9 +3555,11 @@
         <p:spPr/>
         <p:txBody>
           <a:bodyPr/>
+          <a:lstStyle/>
           <a:p>
             <a:fld id="{9B618960-8005-486C-9A75-10CB2AAC16F9}" type="slidenum">
               <a:rPr lang="en-US" smtClean="0"/>
+              <a:t>3</a:t>
             </a:fld>
             <a:endParaRPr lang="en-US"/>
           </a:p>
@@ -3596,14 +3569,14 @@
         <p:nvPicPr>
           <p:cNvPr id="6" name="Content Placeholder 5"/>
           <p:cNvPicPr>
-            <a:picLocks noChangeAspect="1"/>
+            <a:picLocks noGrp="1" noChangeAspect="1"/>
           </p:cNvPicPr>
           <p:nvPr>
             <p:ph idx="1"/>
           </p:nvPr>
         </p:nvPicPr>
         <p:blipFill>
-          <a:blip r:embed="rId1"/>
+          <a:blip r:embed="rId2"/>
           <a:stretch>
             <a:fillRect/>
           </a:stretch>
@@ -3635,7 +3608,14 @@
         <p:cNvGrpSpPr/>
         <p:nvPr/>
       </p:nvGrpSpPr>
-      <p:grpSpPr/>
+      <p:grpSpPr>
+        <a:xfrm>
+          <a:off x="0" y="0"/>
+          <a:ext cx="0" cy="0"/>
+          <a:chOff x="0" y="0"/>
+          <a:chExt cx="0" cy="0"/>
+        </a:xfrm>
+      </p:grpSpPr>
       <p:sp>
         <p:nvSpPr>
           <p:cNvPr id="2" name="Title 1"/>
@@ -3649,6 +3629,7 @@
         <p:spPr/>
         <p:txBody>
           <a:bodyPr/>
+          <a:lstStyle/>
           <a:p>
             <a:endParaRPr lang="en-US"/>
           </a:p>
@@ -3667,9 +3648,11 @@
         <p:spPr/>
         <p:txBody>
           <a:bodyPr/>
+          <a:lstStyle/>
           <a:p>
             <a:fld id="{9B618960-8005-486C-9A75-10CB2AAC16F9}" type="slidenum">
               <a:rPr lang="en-US" smtClean="0"/>
+              <a:t>4</a:t>
             </a:fld>
             <a:endParaRPr lang="en-US"/>
           </a:p>
@@ -3679,14 +3662,14 @@
         <p:nvPicPr>
           <p:cNvPr id="5" name="Content Placeholder 4"/>
           <p:cNvPicPr>
-            <a:picLocks noChangeAspect="1"/>
+            <a:picLocks noGrp="1" noChangeAspect="1"/>
           </p:cNvPicPr>
           <p:nvPr>
             <p:ph idx="1"/>
           </p:nvPr>
         </p:nvPicPr>
         <p:blipFill>
-          <a:blip r:embed="rId1"/>
+          <a:blip r:embed="rId2"/>
           <a:stretch>
             <a:fillRect/>
           </a:stretch>
@@ -3718,7 +3701,14 @@
         <p:cNvGrpSpPr/>
         <p:nvPr/>
       </p:nvGrpSpPr>
-      <p:grpSpPr/>
+      <p:grpSpPr>
+        <a:xfrm>
+          <a:off x="0" y="0"/>
+          <a:ext cx="0" cy="0"/>
+          <a:chOff x="0" y="0"/>
+          <a:chExt cx="0" cy="0"/>
+        </a:xfrm>
+      </p:grpSpPr>
       <p:sp>
         <p:nvSpPr>
           <p:cNvPr id="2" name="Title 1"/>
@@ -3732,6 +3722,7 @@
         <p:spPr/>
         <p:txBody>
           <a:bodyPr/>
+          <a:lstStyle/>
           <a:p>
             <a:endParaRPr lang="en-US"/>
           </a:p>
@@ -3750,9 +3741,11 @@
         <p:spPr/>
         <p:txBody>
           <a:bodyPr/>
+          <a:lstStyle/>
           <a:p>
             <a:fld id="{9B618960-8005-486C-9A75-10CB2AAC16F9}" type="slidenum">
               <a:rPr lang="en-US" smtClean="0"/>
+              <a:t>5</a:t>
             </a:fld>
             <a:endParaRPr lang="en-US"/>
           </a:p>
@@ -3762,7 +3755,7 @@
         <p:nvGraphicFramePr>
           <p:cNvPr id="8" name="Content Placeholder 7"/>
           <p:cNvGraphicFramePr>
-            <a:graphicFrameLocks noChangeAspect="1"/>
+            <a:graphicFrameLocks noGrp="1" noChangeAspect="1"/>
           </p:cNvGraphicFramePr>
           <p:nvPr>
             <p:ph idx="1"/>
@@ -3776,12 +3769,12 @@
           <a:graphicData uri="http://schemas.openxmlformats.org/presentationml/2006/ole">
             <mc:AlternateContent xmlns:mc="http://schemas.openxmlformats.org/markup-compatibility/2006">
               <mc:Choice xmlns:v="urn:schemas-microsoft-com:vml" Requires="v">
-                <p:oleObj spid="_x0000_s9" name="" r:id="rId1" imgW="11039475" imgH="5619750" progId="Paint.Picture">
+                <p:oleObj r:id="rId2" imgW="11039475" imgH="5619750" progId="Paint.Picture">
                   <p:embed/>
                 </p:oleObj>
               </mc:Choice>
               <mc:Fallback>
-                <p:oleObj name="" r:id="rId1" imgW="11039475" imgH="5619750" progId="Paint.Picture">
+                <p:oleObj r:id="rId2" imgW="11039475" imgH="5619750" progId="Paint.Picture">
                   <p:embed/>
                   <p:pic>
                     <p:nvPicPr>
@@ -3790,7 +3783,7 @@
                       <p:nvPr/>
                     </p:nvPicPr>
                     <p:blipFill>
-                      <a:blip r:embed="rId2"/>
+                      <a:blip r:embed="rId3"/>
                       <a:stretch>
                         <a:fillRect/>
                       </a:stretch>
@@ -3828,25 +3821,14 @@
         <p:cNvGrpSpPr/>
         <p:nvPr/>
       </p:nvGrpSpPr>
-      <p:grpSpPr/>
-      <p:sp>
-        <p:nvSpPr>
-          <p:cNvPr id="2" name="Title 1"/>
-          <p:cNvSpPr>
-            <a:spLocks noGrp="1"/>
-          </p:cNvSpPr>
-          <p:nvPr>
-            <p:ph type="title"/>
-          </p:nvPr>
-        </p:nvSpPr>
-        <p:spPr/>
-        <p:txBody>
-          <a:bodyPr/>
-          <a:p>
-            <a:endParaRPr lang="en-US"/>
-          </a:p>
-        </p:txBody>
-      </p:sp>
+      <p:grpSpPr>
+        <a:xfrm>
+          <a:off x="0" y="0"/>
+          <a:ext cx="0" cy="0"/>
+          <a:chOff x="0" y="0"/>
+          <a:chExt cx="0" cy="0"/>
+        </a:xfrm>
+      </p:grpSpPr>
       <p:sp>
         <p:nvSpPr>
           <p:cNvPr id="4" name="Slide Number Placeholder 3"/>
@@ -3860,9 +3842,11 @@
         <p:spPr/>
         <p:txBody>
           <a:bodyPr/>
+          <a:lstStyle/>
           <a:p>
             <a:fld id="{9B618960-8005-486C-9A75-10CB2AAC16F9}" type="slidenum">
               <a:rPr lang="en-US" smtClean="0"/>
+              <a:t>6</a:t>
             </a:fld>
             <a:endParaRPr lang="en-US"/>
           </a:p>
@@ -3872,7 +3856,7 @@
         <p:nvGraphicFramePr>
           <p:cNvPr id="5" name="Content Placeholder 4"/>
           <p:cNvGraphicFramePr>
-            <a:graphicFrameLocks noChangeAspect="1"/>
+            <a:graphicFrameLocks noGrp="1" noChangeAspect="1"/>
           </p:cNvGraphicFramePr>
           <p:nvPr>
             <p:ph idx="1"/>
@@ -3886,12 +3870,12 @@
           <a:graphicData uri="http://schemas.openxmlformats.org/presentationml/2006/ole">
             <mc:AlternateContent xmlns:mc="http://schemas.openxmlformats.org/markup-compatibility/2006">
               <mc:Choice xmlns:v="urn:schemas-microsoft-com:vml" Requires="v">
-                <p:oleObj spid="_x0000_s6" name="" r:id="rId1" imgW="9582150" imgH="5324475" progId="Paint.Picture">
+                <p:oleObj r:id="rId2" imgW="9582150" imgH="5324475" progId="Paint.Picture">
                   <p:embed/>
                 </p:oleObj>
               </mc:Choice>
               <mc:Fallback>
-                <p:oleObj name="" r:id="rId1" imgW="9582150" imgH="5324475" progId="Paint.Picture">
+                <p:oleObj r:id="rId2" imgW="9582150" imgH="5324475" progId="Paint.Picture">
                   <p:embed/>
                   <p:pic>
                     <p:nvPicPr>
@@ -3900,7 +3884,7 @@
                       <p:nvPr/>
                     </p:nvPicPr>
                     <p:blipFill>
-                      <a:blip r:embed="rId2"/>
+                      <a:blip r:embed="rId3"/>
                       <a:stretch>
                         <a:fillRect/>
                       </a:stretch>
@@ -4180,6 +4164,8 @@
       </a:bgFillStyleLst>
     </a:fmtScheme>
   </a:themeElements>
+  <a:objectDefaults/>
+  <a:extraClrSchemeLst/>
   <a:extLst>
     <a:ext uri="{05A4C25C-085E-4340-85A3-A5531E510DB2}">
       <thm15:themeFamily xmlns:thm15="http://schemas.microsoft.com/office/thememl/2012/main" name="Office Theme" id="{62F939B6-93AF-4DB8-9C6B-D6C7DFDC589F}" vid="{4A3C46E8-61CC-4603-A589-7422A47A8E4A}"/>
@@ -4439,6 +4425,8 @@
       </a:bgFillStyleLst>
     </a:fmtScheme>
   </a:themeElements>
+  <a:objectDefaults/>
+  <a:extraClrSchemeLst/>
   <a:extLst>
     <a:ext uri="{05A4C25C-085E-4340-85A3-A5531E510DB2}">
       <thm15:themeFamily xmlns:thm15="http://schemas.microsoft.com/office/thememl/2012/main" name="Office Theme" id="{62F939B6-93AF-4DB8-9C6B-D6C7DFDC589F}" vid="{4A3C46E8-61CC-4603-A589-7422A47A8E4A}"/>

</xml_diff>